<commit_message>
SRS: improved quality for most of the figures
</commit_message>
<xml_diff>
--- a/docs/SRS/figures/spot_ratio/sampling_scenarios-extra.pptx
+++ b/docs/SRS/figures/spot_ratio/sampling_scenarios-extra.pptx
@@ -243,7 +243,7 @@
           <a:p>
             <a:fld id="{D00304F6-771F-48BC-9F4A-837AD6C9796E}" type="datetimeFigureOut">
               <a:rPr lang="en-CA" smtClean="0"/>
-              <a:t>2023-02-12</a:t>
+              <a:t>2023-02-17</a:t>
             </a:fld>
             <a:endParaRPr lang="en-CA"/>
           </a:p>
@@ -413,7 +413,7 @@
           <a:p>
             <a:fld id="{D00304F6-771F-48BC-9F4A-837AD6C9796E}" type="datetimeFigureOut">
               <a:rPr lang="en-CA" smtClean="0"/>
-              <a:t>2023-02-12</a:t>
+              <a:t>2023-02-17</a:t>
             </a:fld>
             <a:endParaRPr lang="en-CA"/>
           </a:p>
@@ -593,7 +593,7 @@
           <a:p>
             <a:fld id="{D00304F6-771F-48BC-9F4A-837AD6C9796E}" type="datetimeFigureOut">
               <a:rPr lang="en-CA" smtClean="0"/>
-              <a:t>2023-02-12</a:t>
+              <a:t>2023-02-17</a:t>
             </a:fld>
             <a:endParaRPr lang="en-CA"/>
           </a:p>
@@ -763,7 +763,7 @@
           <a:p>
             <a:fld id="{D00304F6-771F-48BC-9F4A-837AD6C9796E}" type="datetimeFigureOut">
               <a:rPr lang="en-CA" smtClean="0"/>
-              <a:t>2023-02-12</a:t>
+              <a:t>2023-02-17</a:t>
             </a:fld>
             <a:endParaRPr lang="en-CA"/>
           </a:p>
@@ -1007,7 +1007,7 @@
           <a:p>
             <a:fld id="{D00304F6-771F-48BC-9F4A-837AD6C9796E}" type="datetimeFigureOut">
               <a:rPr lang="en-CA" smtClean="0"/>
-              <a:t>2023-02-12</a:t>
+              <a:t>2023-02-17</a:t>
             </a:fld>
             <a:endParaRPr lang="en-CA"/>
           </a:p>
@@ -1239,7 +1239,7 @@
           <a:p>
             <a:fld id="{D00304F6-771F-48BC-9F4A-837AD6C9796E}" type="datetimeFigureOut">
               <a:rPr lang="en-CA" smtClean="0"/>
-              <a:t>2023-02-12</a:t>
+              <a:t>2023-02-17</a:t>
             </a:fld>
             <a:endParaRPr lang="en-CA"/>
           </a:p>
@@ -1606,7 +1606,7 @@
           <a:p>
             <a:fld id="{D00304F6-771F-48BC-9F4A-837AD6C9796E}" type="datetimeFigureOut">
               <a:rPr lang="en-CA" smtClean="0"/>
-              <a:t>2023-02-12</a:t>
+              <a:t>2023-02-17</a:t>
             </a:fld>
             <a:endParaRPr lang="en-CA"/>
           </a:p>
@@ -1724,7 +1724,7 @@
           <a:p>
             <a:fld id="{D00304F6-771F-48BC-9F4A-837AD6C9796E}" type="datetimeFigureOut">
               <a:rPr lang="en-CA" smtClean="0"/>
-              <a:t>2023-02-12</a:t>
+              <a:t>2023-02-17</a:t>
             </a:fld>
             <a:endParaRPr lang="en-CA"/>
           </a:p>
@@ -1819,7 +1819,7 @@
           <a:p>
             <a:fld id="{D00304F6-771F-48BC-9F4A-837AD6C9796E}" type="datetimeFigureOut">
               <a:rPr lang="en-CA" smtClean="0"/>
-              <a:t>2023-02-12</a:t>
+              <a:t>2023-02-17</a:t>
             </a:fld>
             <a:endParaRPr lang="en-CA"/>
           </a:p>
@@ -2096,7 +2096,7 @@
           <a:p>
             <a:fld id="{D00304F6-771F-48BC-9F4A-837AD6C9796E}" type="datetimeFigureOut">
               <a:rPr lang="en-CA" smtClean="0"/>
-              <a:t>2023-02-12</a:t>
+              <a:t>2023-02-17</a:t>
             </a:fld>
             <a:endParaRPr lang="en-CA"/>
           </a:p>
@@ -2353,7 +2353,7 @@
           <a:p>
             <a:fld id="{D00304F6-771F-48BC-9F4A-837AD6C9796E}" type="datetimeFigureOut">
               <a:rPr lang="en-CA" smtClean="0"/>
-              <a:t>2023-02-12</a:t>
+              <a:t>2023-02-17</a:t>
             </a:fld>
             <a:endParaRPr lang="en-CA"/>
           </a:p>
@@ -2566,7 +2566,7 @@
           <a:p>
             <a:fld id="{D00304F6-771F-48BC-9F4A-837AD6C9796E}" type="datetimeFigureOut">
               <a:rPr lang="en-CA" smtClean="0"/>
-              <a:t>2023-02-12</a:t>
+              <a:t>2023-02-17</a:t>
             </a:fld>
             <a:endParaRPr lang="en-CA"/>
           </a:p>
@@ -3245,35 +3245,6 @@
           </a:p>
         </p:txBody>
       </p:sp>
-      <p:pic>
-        <p:nvPicPr>
-          <p:cNvPr id="10" name="Picture 9">
-            <a:extLst>
-              <a:ext uri="{FF2B5EF4-FFF2-40B4-BE49-F238E27FC236}">
-                <a16:creationId xmlns:a16="http://schemas.microsoft.com/office/drawing/2014/main" id="{140456B0-707E-3AD2-228B-FCB7BC3050CB}"/>
-              </a:ext>
-            </a:extLst>
-          </p:cNvPr>
-          <p:cNvPicPr>
-            <a:picLocks noChangeAspect="1"/>
-          </p:cNvPicPr>
-          <p:nvPr/>
-        </p:nvPicPr>
-        <p:blipFill rotWithShape="1">
-          <a:blip r:embed="rId2"/>
-          <a:srcRect l="1898" t="2345" r="5423" b="3953"/>
-          <a:stretch/>
-        </p:blipFill>
-        <p:spPr>
-          <a:xfrm>
-            <a:off x="3253382" y="671784"/>
-            <a:ext cx="2090202" cy="2085912"/>
-          </a:xfrm>
-          <a:prstGeom prst="rect">
-            <a:avLst/>
-          </a:prstGeom>
-        </p:spPr>
-      </p:pic>
       <p:sp>
         <p:nvSpPr>
           <p:cNvPr id="11" name="TextBox 10">
@@ -3549,35 +3520,6 @@
           </a:p>
         </p:txBody>
       </p:sp>
-      <p:pic>
-        <p:nvPicPr>
-          <p:cNvPr id="17" name="Picture 16">
-            <a:extLst>
-              <a:ext uri="{FF2B5EF4-FFF2-40B4-BE49-F238E27FC236}">
-                <a16:creationId xmlns:a16="http://schemas.microsoft.com/office/drawing/2014/main" id="{E1D57601-1626-8067-546E-B7E9E02E70A8}"/>
-              </a:ext>
-            </a:extLst>
-          </p:cNvPr>
-          <p:cNvPicPr>
-            <a:picLocks noChangeAspect="1"/>
-          </p:cNvPicPr>
-          <p:nvPr/>
-        </p:nvPicPr>
-        <p:blipFill rotWithShape="1">
-          <a:blip r:embed="rId3"/>
-          <a:srcRect l="5342" t="5687" r="3148" b="4992"/>
-          <a:stretch/>
-        </p:blipFill>
-        <p:spPr>
-          <a:xfrm>
-            <a:off x="3253382" y="3635298"/>
-            <a:ext cx="2090203" cy="2079062"/>
-          </a:xfrm>
-          <a:prstGeom prst="rect">
-            <a:avLst/>
-          </a:prstGeom>
-        </p:spPr>
-      </p:pic>
       <p:sp>
         <p:nvSpPr>
           <p:cNvPr id="18" name="TextBox 17">
@@ -3731,6 +3673,78 @@
           </a:p>
         </p:txBody>
       </p:sp>
+      <p:pic>
+        <p:nvPicPr>
+          <p:cNvPr id="22" name="Picture 21" descr="A close up of a person&#10;&#10;Description automatically generated with low confidence">
+            <a:extLst>
+              <a:ext uri="{FF2B5EF4-FFF2-40B4-BE49-F238E27FC236}">
+                <a16:creationId xmlns:a16="http://schemas.microsoft.com/office/drawing/2014/main" id="{65006D05-E565-D1A1-2B20-5BD96662D456}"/>
+              </a:ext>
+            </a:extLst>
+          </p:cNvPr>
+          <p:cNvPicPr>
+            <a:picLocks noChangeAspect="1"/>
+          </p:cNvPicPr>
+          <p:nvPr/>
+        </p:nvPicPr>
+        <p:blipFill>
+          <a:blip r:embed="rId2">
+            <a:extLst>
+              <a:ext uri="{28A0092B-C50C-407E-A947-70E740481C1C}">
+                <a14:useLocalDpi xmlns:a14="http://schemas.microsoft.com/office/drawing/2010/main" val="0"/>
+              </a:ext>
+            </a:extLst>
+          </a:blip>
+          <a:stretch>
+            <a:fillRect/>
+          </a:stretch>
+        </p:blipFill>
+        <p:spPr>
+          <a:xfrm>
+            <a:off x="3255584" y="3630829"/>
+            <a:ext cx="2088000" cy="2088000"/>
+          </a:xfrm>
+          <a:prstGeom prst="rect">
+            <a:avLst/>
+          </a:prstGeom>
+        </p:spPr>
+      </p:pic>
+      <p:pic>
+        <p:nvPicPr>
+          <p:cNvPr id="25" name="Picture 24" descr="A black and white checkered background&#10;&#10;Description automatically generated with low confidence">
+            <a:extLst>
+              <a:ext uri="{FF2B5EF4-FFF2-40B4-BE49-F238E27FC236}">
+                <a16:creationId xmlns:a16="http://schemas.microsoft.com/office/drawing/2014/main" id="{E910069F-8884-CEC0-BAB2-73CEF09C8138}"/>
+              </a:ext>
+            </a:extLst>
+          </p:cNvPr>
+          <p:cNvPicPr>
+            <a:picLocks noChangeAspect="1"/>
+          </p:cNvPicPr>
+          <p:nvPr/>
+        </p:nvPicPr>
+        <p:blipFill>
+          <a:blip r:embed="rId3">
+            <a:extLst>
+              <a:ext uri="{28A0092B-C50C-407E-A947-70E740481C1C}">
+                <a14:useLocalDpi xmlns:a14="http://schemas.microsoft.com/office/drawing/2010/main" val="0"/>
+              </a:ext>
+            </a:extLst>
+          </a:blip>
+          <a:stretch>
+            <a:fillRect/>
+          </a:stretch>
+        </p:blipFill>
+        <p:spPr>
+          <a:xfrm>
+            <a:off x="3253382" y="670740"/>
+            <a:ext cx="2088000" cy="2088000"/>
+          </a:xfrm>
+          <a:prstGeom prst="rect">
+            <a:avLst/>
+          </a:prstGeom>
+        </p:spPr>
+      </p:pic>
     </p:spTree>
     <p:extLst>
       <p:ext uri="{BB962C8B-B14F-4D97-AF65-F5344CB8AC3E}">

</xml_diff>